<commit_message>
Presentation about Window Functions edited
</commit_message>
<xml_diff>
--- a/Presentation/Window functions.pptx
+++ b/Presentation/Window functions.pptx
@@ -161,7 +161,7 @@
   </p:defaultTextStyle>
   <p:extLst>
     <p:ext uri="{521415D9-36F7-43E2-AB2F-B90AF26B5E84}">
-      <p14:sectionLst xmlns:p14="http://schemas.microsoft.com/office/powerpoint/2010/main">
+      <p14:sectionLst xmlns:p14="http://schemas.microsoft.com/office/powerpoint/2010/main" xmlns="">
         <p14:section name="Default Section" id="{5993470C-4786-4D38-90BE-AF14FB3A0120}">
           <p14:sldIdLst>
             <p14:sldId id="1224"/>
@@ -190,7 +190,7 @@
       </p14:sectionLst>
     </p:ext>
     <p:ext uri="{EFAFB233-063F-42B5-8137-9DF3F51BA10A}">
-      <p15:sldGuideLst xmlns:p15="http://schemas.microsoft.com/office/powerpoint/2012/main" xmlns="">
+      <p15:sldGuideLst xmlns="" xmlns:p15="http://schemas.microsoft.com/office/powerpoint/2012/main">
         <p15:guide id="1" orient="horz" pos="1979" userDrawn="1">
           <p15:clr>
             <a:srgbClr val="A4A3A4"/>
@@ -1687,7 +1687,7 @@
     </p:spTree>
     <p:extLst>
       <p:ext uri="{BB962C8B-B14F-4D97-AF65-F5344CB8AC3E}">
-        <p14:creationId xmlns:p14="http://schemas.microsoft.com/office/powerpoint/2010/main" val="665591369"/>
+        <p14:creationId xmlns:p14="http://schemas.microsoft.com/office/powerpoint/2010/main" xmlns="" val="665591369"/>
       </p:ext>
     </p:extLst>
   </p:cSld>
@@ -1897,7 +1897,7 @@
     </p:spTree>
     <p:extLst>
       <p:ext uri="{BB962C8B-B14F-4D97-AF65-F5344CB8AC3E}">
-        <p14:creationId xmlns:p14="http://schemas.microsoft.com/office/powerpoint/2010/main" val="3109304561"/>
+        <p14:creationId xmlns:p14="http://schemas.microsoft.com/office/powerpoint/2010/main" xmlns="" val="3109304561"/>
       </p:ext>
     </p:extLst>
   </p:cSld>
@@ -1988,7 +1988,7 @@
           <p:cNvPr id="8" name="Picture 7">
             <a:extLst>
               <a:ext uri="{FF2B5EF4-FFF2-40B4-BE49-F238E27FC236}">
-                <a16:creationId xmlns:a16="http://schemas.microsoft.com/office/drawing/2014/main" xmlns="" id="{1CF45043-0DF6-7844-A454-194D648F98F1}"/>
+                <a16:creationId xmlns="" xmlns:a16="http://schemas.microsoft.com/office/drawing/2014/main" id="{1CF45043-0DF6-7844-A454-194D648F98F1}"/>
               </a:ext>
             </a:extLst>
           </p:cNvPr>
@@ -1998,7 +1998,7 @@
           <p:nvPr userDrawn="1"/>
         </p:nvPicPr>
         <p:blipFill>
-          <a:blip r:embed="rId2"/>
+          <a:blip r:embed="rId2" cstate="print"/>
           <a:stretch>
             <a:fillRect/>
           </a:stretch>
@@ -2018,7 +2018,7 @@
           <p:cNvPr id="10" name="Title 8">
             <a:extLst>
               <a:ext uri="{FF2B5EF4-FFF2-40B4-BE49-F238E27FC236}">
-                <a16:creationId xmlns:a16="http://schemas.microsoft.com/office/drawing/2014/main" xmlns="" id="{353C5CCE-34CF-4745-B8D7-AF744DB56245}"/>
+                <a16:creationId xmlns="" xmlns:a16="http://schemas.microsoft.com/office/drawing/2014/main" id="{353C5CCE-34CF-4745-B8D7-AF744DB56245}"/>
               </a:ext>
             </a:extLst>
           </p:cNvPr>
@@ -2101,7 +2101,7 @@
     </p:spTree>
     <p:extLst>
       <p:ext uri="{BB962C8B-B14F-4D97-AF65-F5344CB8AC3E}">
-        <p14:creationId xmlns:p14="http://schemas.microsoft.com/office/powerpoint/2010/main" val="81653296"/>
+        <p14:creationId xmlns:p14="http://schemas.microsoft.com/office/powerpoint/2010/main" xmlns="" val="81653296"/>
       </p:ext>
     </p:extLst>
   </p:cSld>
@@ -2303,7 +2303,7 @@
     </p:spTree>
     <p:extLst>
       <p:ext uri="{BB962C8B-B14F-4D97-AF65-F5344CB8AC3E}">
-        <p14:creationId xmlns:p14="http://schemas.microsoft.com/office/powerpoint/2010/main" val="349239717"/>
+        <p14:creationId xmlns:p14="http://schemas.microsoft.com/office/powerpoint/2010/main" xmlns="" val="349239717"/>
       </p:ext>
     </p:extLst>
   </p:cSld>
@@ -2729,7 +2729,7 @@
           <p:cNvPr id="10" name="Title 1">
             <a:extLst>
               <a:ext uri="{FF2B5EF4-FFF2-40B4-BE49-F238E27FC236}">
-                <a16:creationId xmlns:a16="http://schemas.microsoft.com/office/drawing/2014/main" xmlns="" id="{B4B68A2E-49F8-4BDA-BD1A-488169336555}"/>
+                <a16:creationId xmlns="" xmlns:a16="http://schemas.microsoft.com/office/drawing/2014/main" id="{B4B68A2E-49F8-4BDA-BD1A-488169336555}"/>
               </a:ext>
             </a:extLst>
           </p:cNvPr>
@@ -2769,7 +2769,7 @@
     </p:spTree>
     <p:extLst>
       <p:ext uri="{BB962C8B-B14F-4D97-AF65-F5344CB8AC3E}">
-        <p14:creationId xmlns:p14="http://schemas.microsoft.com/office/powerpoint/2010/main" val="2905492195"/>
+        <p14:creationId xmlns:p14="http://schemas.microsoft.com/office/powerpoint/2010/main" xmlns="" val="2905492195"/>
       </p:ext>
     </p:extLst>
   </p:cSld>
@@ -2975,7 +2975,7 @@
     </p:spTree>
     <p:extLst>
       <p:ext uri="{BB962C8B-B14F-4D97-AF65-F5344CB8AC3E}">
-        <p14:creationId xmlns:p14="http://schemas.microsoft.com/office/powerpoint/2010/main" val="668672174"/>
+        <p14:creationId xmlns:p14="http://schemas.microsoft.com/office/powerpoint/2010/main" xmlns="" val="668672174"/>
       </p:ext>
     </p:extLst>
   </p:cSld>
@@ -3064,7 +3064,7 @@
           <p:cNvPr id="8" name="Picture 7">
             <a:extLst>
               <a:ext uri="{FF2B5EF4-FFF2-40B4-BE49-F238E27FC236}">
-                <a16:creationId xmlns:a16="http://schemas.microsoft.com/office/drawing/2014/main" xmlns="" id="{1CF45043-0DF6-7844-A454-194D648F98F1}"/>
+                <a16:creationId xmlns="" xmlns:a16="http://schemas.microsoft.com/office/drawing/2014/main" id="{1CF45043-0DF6-7844-A454-194D648F98F1}"/>
               </a:ext>
             </a:extLst>
           </p:cNvPr>
@@ -3074,7 +3074,7 @@
           <p:nvPr userDrawn="1"/>
         </p:nvPicPr>
         <p:blipFill>
-          <a:blip r:embed="rId2"/>
+          <a:blip r:embed="rId2" cstate="print"/>
           <a:stretch>
             <a:fillRect/>
           </a:stretch>
@@ -3094,7 +3094,7 @@
           <p:cNvPr id="10" name="Title 8">
             <a:extLst>
               <a:ext uri="{FF2B5EF4-FFF2-40B4-BE49-F238E27FC236}">
-                <a16:creationId xmlns:a16="http://schemas.microsoft.com/office/drawing/2014/main" xmlns="" id="{353C5CCE-34CF-4745-B8D7-AF744DB56245}"/>
+                <a16:creationId xmlns="" xmlns:a16="http://schemas.microsoft.com/office/drawing/2014/main" id="{353C5CCE-34CF-4745-B8D7-AF744DB56245}"/>
               </a:ext>
             </a:extLst>
           </p:cNvPr>
@@ -3177,7 +3177,7 @@
     </p:spTree>
     <p:extLst>
       <p:ext uri="{BB962C8B-B14F-4D97-AF65-F5344CB8AC3E}">
-        <p14:creationId xmlns:p14="http://schemas.microsoft.com/office/powerpoint/2010/main" val="4199888668"/>
+        <p14:creationId xmlns:p14="http://schemas.microsoft.com/office/powerpoint/2010/main" xmlns="" val="4199888668"/>
       </p:ext>
     </p:extLst>
   </p:cSld>
@@ -3309,7 +3309,7 @@
           <p:cNvPr id="7" name="Picture 6">
             <a:extLst>
               <a:ext uri="{FF2B5EF4-FFF2-40B4-BE49-F238E27FC236}">
-                <a16:creationId xmlns:a16="http://schemas.microsoft.com/office/drawing/2014/main" xmlns="" id="{19906801-963A-2748-A48D-2607EEFEA3B7}"/>
+                <a16:creationId xmlns="" xmlns:a16="http://schemas.microsoft.com/office/drawing/2014/main" id="{19906801-963A-2748-A48D-2607EEFEA3B7}"/>
               </a:ext>
             </a:extLst>
           </p:cNvPr>
@@ -3319,7 +3319,7 @@
           <p:nvPr userDrawn="1"/>
         </p:nvPicPr>
         <p:blipFill>
-          <a:blip r:embed="rId2"/>
+          <a:blip r:embed="rId2" cstate="print"/>
           <a:stretch>
             <a:fillRect/>
           </a:stretch>
@@ -3337,7 +3337,7 @@
     </p:spTree>
     <p:extLst>
       <p:ext uri="{BB962C8B-B14F-4D97-AF65-F5344CB8AC3E}">
-        <p14:creationId xmlns:p14="http://schemas.microsoft.com/office/powerpoint/2010/main" val="1748765748"/>
+        <p14:creationId xmlns:p14="http://schemas.microsoft.com/office/powerpoint/2010/main" xmlns="" val="1748765748"/>
       </p:ext>
     </p:extLst>
   </p:cSld>
@@ -3580,7 +3580,7 @@
           <a:blip r:embed="rId2" cstate="print">
             <a:extLst>
               <a:ext uri="{28A0092B-C50C-407E-A947-70E740481C1C}">
-                <a14:useLocalDpi xmlns:a14="http://schemas.microsoft.com/office/drawing/2010/main" val="0"/>
+                <a14:useLocalDpi xmlns:a14="http://schemas.microsoft.com/office/drawing/2010/main" xmlns="" val="0"/>
               </a:ext>
             </a:extLst>
           </a:blip>
@@ -3601,7 +3601,7 @@
     </p:spTree>
     <p:extLst>
       <p:ext uri="{BB962C8B-B14F-4D97-AF65-F5344CB8AC3E}">
-        <p14:creationId xmlns:p14="http://schemas.microsoft.com/office/powerpoint/2010/main" val="3124640893"/>
+        <p14:creationId xmlns:p14="http://schemas.microsoft.com/office/powerpoint/2010/main" xmlns="" val="3124640893"/>
       </p:ext>
     </p:extLst>
   </p:cSld>
@@ -3786,7 +3786,7 @@
     </p:spTree>
     <p:extLst>
       <p:ext uri="{BB962C8B-B14F-4D97-AF65-F5344CB8AC3E}">
-        <p14:creationId xmlns:p14="http://schemas.microsoft.com/office/powerpoint/2010/main" val="3487044374"/>
+        <p14:creationId xmlns:p14="http://schemas.microsoft.com/office/powerpoint/2010/main" xmlns="" val="3487044374"/>
       </p:ext>
     </p:extLst>
   </p:cSld>
@@ -3963,7 +3963,7 @@
     </p:spTree>
     <p:extLst>
       <p:ext uri="{BB962C8B-B14F-4D97-AF65-F5344CB8AC3E}">
-        <p14:creationId xmlns:p14="http://schemas.microsoft.com/office/powerpoint/2010/main" val="2942273764"/>
+        <p14:creationId xmlns:p14="http://schemas.microsoft.com/office/powerpoint/2010/main" xmlns="" val="2942273764"/>
       </p:ext>
     </p:extLst>
   </p:cSld>
@@ -4011,7 +4011,7 @@
           <p:cNvPr id="9" name="Picture 8">
             <a:extLst>
               <a:ext uri="{FF2B5EF4-FFF2-40B4-BE49-F238E27FC236}">
-                <a16:creationId xmlns:a16="http://schemas.microsoft.com/office/drawing/2014/main" xmlns="" id="{21C47469-3B03-E44C-89B5-F697BC2200BB}"/>
+                <a16:creationId xmlns="" xmlns:a16="http://schemas.microsoft.com/office/drawing/2014/main" id="{21C47469-3B03-E44C-89B5-F697BC2200BB}"/>
               </a:ext>
             </a:extLst>
           </p:cNvPr>
@@ -4021,7 +4021,7 @@
           <p:nvPr userDrawn="1"/>
         </p:nvPicPr>
         <p:blipFill>
-          <a:blip r:embed="rId2"/>
+          <a:blip r:embed="rId2" cstate="print"/>
           <a:stretch>
             <a:fillRect/>
           </a:stretch>
@@ -4039,7 +4039,7 @@
     </p:spTree>
     <p:extLst>
       <p:ext uri="{BB962C8B-B14F-4D97-AF65-F5344CB8AC3E}">
-        <p14:creationId xmlns:p14="http://schemas.microsoft.com/office/powerpoint/2010/main" val="4246667664"/>
+        <p14:creationId xmlns:p14="http://schemas.microsoft.com/office/powerpoint/2010/main" xmlns="" val="4246667664"/>
       </p:ext>
     </p:extLst>
   </p:cSld>
@@ -4327,7 +4327,7 @@
     </p:spTree>
     <p:extLst>
       <p:ext uri="{BB962C8B-B14F-4D97-AF65-F5344CB8AC3E}">
-        <p14:creationId xmlns:p14="http://schemas.microsoft.com/office/powerpoint/2010/main" val="1476371118"/>
+        <p14:creationId xmlns:p14="http://schemas.microsoft.com/office/powerpoint/2010/main" xmlns="" val="1476371118"/>
       </p:ext>
     </p:extLst>
   </p:cSld>
@@ -4462,7 +4462,7 @@
           <p:cNvPr id="7" name="Picture 6">
             <a:extLst>
               <a:ext uri="{FF2B5EF4-FFF2-40B4-BE49-F238E27FC236}">
-                <a16:creationId xmlns:a16="http://schemas.microsoft.com/office/drawing/2014/main" xmlns="" id="{19906801-963A-2748-A48D-2607EEFEA3B7}"/>
+                <a16:creationId xmlns="" xmlns:a16="http://schemas.microsoft.com/office/drawing/2014/main" id="{19906801-963A-2748-A48D-2607EEFEA3B7}"/>
               </a:ext>
             </a:extLst>
           </p:cNvPr>
@@ -4472,7 +4472,7 @@
           <p:nvPr userDrawn="1"/>
         </p:nvPicPr>
         <p:blipFill>
-          <a:blip r:embed="rId2"/>
+          <a:blip r:embed="rId2" cstate="print"/>
           <a:stretch>
             <a:fillRect/>
           </a:stretch>
@@ -4490,7 +4490,7 @@
     </p:spTree>
     <p:extLst>
       <p:ext uri="{BB962C8B-B14F-4D97-AF65-F5344CB8AC3E}">
-        <p14:creationId xmlns:p14="http://schemas.microsoft.com/office/powerpoint/2010/main" val="361792416"/>
+        <p14:creationId xmlns:p14="http://schemas.microsoft.com/office/powerpoint/2010/main" xmlns="" val="361792416"/>
       </p:ext>
     </p:extLst>
   </p:cSld>
@@ -4881,7 +4881,7 @@
     </p:spTree>
     <p:extLst>
       <p:ext uri="{BB962C8B-B14F-4D97-AF65-F5344CB8AC3E}">
-        <p14:creationId xmlns:p14="http://schemas.microsoft.com/office/powerpoint/2010/main" val="1557238972"/>
+        <p14:creationId xmlns:p14="http://schemas.microsoft.com/office/powerpoint/2010/main" xmlns="" val="1557238972"/>
       </p:ext>
     </p:extLst>
   </p:cSld>
@@ -5166,7 +5166,7 @@
     </p:spTree>
     <p:extLst>
       <p:ext uri="{BB962C8B-B14F-4D97-AF65-F5344CB8AC3E}">
-        <p14:creationId xmlns:p14="http://schemas.microsoft.com/office/powerpoint/2010/main" val="3296732277"/>
+        <p14:creationId xmlns:p14="http://schemas.microsoft.com/office/powerpoint/2010/main" xmlns="" val="3296732277"/>
       </p:ext>
     </p:extLst>
   </p:cSld>
@@ -5368,7 +5368,7 @@
     </p:spTree>
     <p:extLst>
       <p:ext uri="{BB962C8B-B14F-4D97-AF65-F5344CB8AC3E}">
-        <p14:creationId xmlns:p14="http://schemas.microsoft.com/office/powerpoint/2010/main" val="2708236779"/>
+        <p14:creationId xmlns:p14="http://schemas.microsoft.com/office/powerpoint/2010/main" xmlns="" val="2708236779"/>
       </p:ext>
     </p:extLst>
   </p:cSld>
@@ -5791,7 +5791,7 @@
           <p:cNvPr id="10" name="Title 1">
             <a:extLst>
               <a:ext uri="{FF2B5EF4-FFF2-40B4-BE49-F238E27FC236}">
-                <a16:creationId xmlns:a16="http://schemas.microsoft.com/office/drawing/2014/main" xmlns="" id="{B4B68A2E-49F8-4BDA-BD1A-488169336555}"/>
+                <a16:creationId xmlns="" xmlns:a16="http://schemas.microsoft.com/office/drawing/2014/main" id="{B4B68A2E-49F8-4BDA-BD1A-488169336555}"/>
               </a:ext>
             </a:extLst>
           </p:cNvPr>
@@ -5831,7 +5831,7 @@
     </p:spTree>
     <p:extLst>
       <p:ext uri="{BB962C8B-B14F-4D97-AF65-F5344CB8AC3E}">
-        <p14:creationId xmlns:p14="http://schemas.microsoft.com/office/powerpoint/2010/main" val="3666243322"/>
+        <p14:creationId xmlns:p14="http://schemas.microsoft.com/office/powerpoint/2010/main" xmlns="" val="3666243322"/>
       </p:ext>
     </p:extLst>
   </p:cSld>
@@ -6002,7 +6002,7 @@
           <p:cNvPr id="8" name="Picture 7">
             <a:extLst>
               <a:ext uri="{FF2B5EF4-FFF2-40B4-BE49-F238E27FC236}">
-                <a16:creationId xmlns:a16="http://schemas.microsoft.com/office/drawing/2014/main" xmlns="" id="{1CF45043-0DF6-7844-A454-194D648F98F1}"/>
+                <a16:creationId xmlns="" xmlns:a16="http://schemas.microsoft.com/office/drawing/2014/main" id="{1CF45043-0DF6-7844-A454-194D648F98F1}"/>
               </a:ext>
             </a:extLst>
           </p:cNvPr>
@@ -6012,7 +6012,7 @@
           <p:nvPr userDrawn="1"/>
         </p:nvPicPr>
         <p:blipFill>
-          <a:blip r:embed="rId2"/>
+          <a:blip r:embed="rId2" cstate="print"/>
           <a:stretch>
             <a:fillRect/>
           </a:stretch>
@@ -6030,7 +6030,7 @@
     </p:spTree>
     <p:extLst>
       <p:ext uri="{BB962C8B-B14F-4D97-AF65-F5344CB8AC3E}">
-        <p14:creationId xmlns:p14="http://schemas.microsoft.com/office/powerpoint/2010/main" val="934970616"/>
+        <p14:creationId xmlns:p14="http://schemas.microsoft.com/office/powerpoint/2010/main" xmlns="" val="934970616"/>
       </p:ext>
     </p:extLst>
   </p:cSld>
@@ -6163,7 +6163,7 @@
           <p:cNvPr id="7" name="Picture 6">
             <a:extLst>
               <a:ext uri="{FF2B5EF4-FFF2-40B4-BE49-F238E27FC236}">
-                <a16:creationId xmlns:a16="http://schemas.microsoft.com/office/drawing/2014/main" xmlns="" id="{19906801-963A-2748-A48D-2607EEFEA3B7}"/>
+                <a16:creationId xmlns="" xmlns:a16="http://schemas.microsoft.com/office/drawing/2014/main" id="{19906801-963A-2748-A48D-2607EEFEA3B7}"/>
               </a:ext>
             </a:extLst>
           </p:cNvPr>
@@ -6173,7 +6173,7 @@
           <p:nvPr userDrawn="1"/>
         </p:nvPicPr>
         <p:blipFill>
-          <a:blip r:embed="rId2"/>
+          <a:blip r:embed="rId2" cstate="print"/>
           <a:stretch>
             <a:fillRect/>
           </a:stretch>
@@ -6191,7 +6191,7 @@
     </p:spTree>
     <p:extLst>
       <p:ext uri="{BB962C8B-B14F-4D97-AF65-F5344CB8AC3E}">
-        <p14:creationId xmlns:p14="http://schemas.microsoft.com/office/powerpoint/2010/main" val="1368485465"/>
+        <p14:creationId xmlns:p14="http://schemas.microsoft.com/office/powerpoint/2010/main" xmlns="" val="1368485465"/>
       </p:ext>
     </p:extLst>
   </p:cSld>
@@ -6332,7 +6332,7 @@
           <a:blip r:embed="rId2" cstate="print">
             <a:extLst>
               <a:ext uri="{28A0092B-C50C-407E-A947-70E740481C1C}">
-                <a14:useLocalDpi xmlns:a14="http://schemas.microsoft.com/office/drawing/2010/main" val="0"/>
+                <a14:useLocalDpi xmlns:a14="http://schemas.microsoft.com/office/drawing/2010/main" xmlns="" val="0"/>
               </a:ext>
             </a:extLst>
           </a:blip>
@@ -6355,7 +6355,7 @@
           <p:cNvPr id="6" name="Text Placeholder 6">
             <a:extLst>
               <a:ext uri="{FF2B5EF4-FFF2-40B4-BE49-F238E27FC236}">
-                <a16:creationId xmlns:a16="http://schemas.microsoft.com/office/drawing/2014/main" xmlns="" id="{6DDF5AB6-195E-47F9-91E3-98E599C01EFB}"/>
+                <a16:creationId xmlns="" xmlns:a16="http://schemas.microsoft.com/office/drawing/2014/main" id="{6DDF5AB6-195E-47F9-91E3-98E599C01EFB}"/>
               </a:ext>
             </a:extLst>
           </p:cNvPr>
@@ -6465,7 +6465,7 @@
     </p:spTree>
     <p:extLst>
       <p:ext uri="{BB962C8B-B14F-4D97-AF65-F5344CB8AC3E}">
-        <p14:creationId xmlns:p14="http://schemas.microsoft.com/office/powerpoint/2010/main" val="2933953185"/>
+        <p14:creationId xmlns:p14="http://schemas.microsoft.com/office/powerpoint/2010/main" xmlns="" val="2933953185"/>
       </p:ext>
     </p:extLst>
   </p:cSld>
@@ -6653,7 +6653,7 @@
           <p:cNvPr id="9" name="Picture 8">
             <a:extLst>
               <a:ext uri="{FF2B5EF4-FFF2-40B4-BE49-F238E27FC236}">
-                <a16:creationId xmlns:a16="http://schemas.microsoft.com/office/drawing/2014/main" xmlns="" id="{320D1B1E-8401-8049-8729-0C74A6C1928C}"/>
+                <a16:creationId xmlns="" xmlns:a16="http://schemas.microsoft.com/office/drawing/2014/main" id="{320D1B1E-8401-8049-8729-0C74A6C1928C}"/>
               </a:ext>
             </a:extLst>
           </p:cNvPr>
@@ -6663,7 +6663,7 @@
           <p:nvPr userDrawn="1"/>
         </p:nvPicPr>
         <p:blipFill>
-          <a:blip r:embed="rId2"/>
+          <a:blip r:embed="rId2" cstate="print"/>
           <a:stretch>
             <a:fillRect/>
           </a:stretch>
@@ -6681,7 +6681,7 @@
     </p:spTree>
     <p:extLst>
       <p:ext uri="{BB962C8B-B14F-4D97-AF65-F5344CB8AC3E}">
-        <p14:creationId xmlns:p14="http://schemas.microsoft.com/office/powerpoint/2010/main" val="1853630703"/>
+        <p14:creationId xmlns:p14="http://schemas.microsoft.com/office/powerpoint/2010/main" xmlns="" val="1853630703"/>
       </p:ext>
     </p:extLst>
   </p:cSld>
@@ -6858,7 +6858,7 @@
     </p:spTree>
     <p:extLst>
       <p:ext uri="{BB962C8B-B14F-4D97-AF65-F5344CB8AC3E}">
-        <p14:creationId xmlns:p14="http://schemas.microsoft.com/office/powerpoint/2010/main" val="2272720682"/>
+        <p14:creationId xmlns:p14="http://schemas.microsoft.com/office/powerpoint/2010/main" xmlns="" val="2272720682"/>
       </p:ext>
     </p:extLst>
   </p:cSld>
@@ -6905,7 +6905,7 @@
     </p:spTree>
     <p:extLst>
       <p:ext uri="{BB962C8B-B14F-4D97-AF65-F5344CB8AC3E}">
-        <p14:creationId xmlns:p14="http://schemas.microsoft.com/office/powerpoint/2010/main" val="3395631048"/>
+        <p14:creationId xmlns:p14="http://schemas.microsoft.com/office/powerpoint/2010/main" xmlns="" val="3395631048"/>
       </p:ext>
     </p:extLst>
   </p:cSld>
@@ -6937,7 +6937,7 @@
           <p:cNvPr id="9" name="Rectangle 8">
             <a:extLst>
               <a:ext uri="{FF2B5EF4-FFF2-40B4-BE49-F238E27FC236}">
-                <a16:creationId xmlns:a16="http://schemas.microsoft.com/office/drawing/2014/main" xmlns="" id="{9CC0A6A9-FB31-4A19-A170-D23A18C938E0}"/>
+                <a16:creationId xmlns="" xmlns:a16="http://schemas.microsoft.com/office/drawing/2014/main" id="{9CC0A6A9-FB31-4A19-A170-D23A18C938E0}"/>
               </a:ext>
             </a:extLst>
           </p:cNvPr>
@@ -7208,7 +7208,7 @@
           <a:blip r:embed="rId2" cstate="print">
             <a:extLst>
               <a:ext uri="{28A0092B-C50C-407E-A947-70E740481C1C}">
-                <a14:useLocalDpi xmlns:a14="http://schemas.microsoft.com/office/drawing/2010/main" val="0"/>
+                <a14:useLocalDpi xmlns:a14="http://schemas.microsoft.com/office/drawing/2010/main" xmlns="" val="0"/>
               </a:ext>
             </a:extLst>
           </a:blip>
@@ -7229,7 +7229,7 @@
     </p:spTree>
     <p:extLst>
       <p:ext uri="{BB962C8B-B14F-4D97-AF65-F5344CB8AC3E}">
-        <p14:creationId xmlns:p14="http://schemas.microsoft.com/office/powerpoint/2010/main" val="103784457"/>
+        <p14:creationId xmlns:p14="http://schemas.microsoft.com/office/powerpoint/2010/main" xmlns="" val="103784457"/>
       </p:ext>
     </p:extLst>
   </p:cSld>
@@ -7518,7 +7518,7 @@
     </p:spTree>
     <p:extLst>
       <p:ext uri="{BB962C8B-B14F-4D97-AF65-F5344CB8AC3E}">
-        <p14:creationId xmlns:p14="http://schemas.microsoft.com/office/powerpoint/2010/main" val="3771121783"/>
+        <p14:creationId xmlns:p14="http://schemas.microsoft.com/office/powerpoint/2010/main" xmlns="" val="3771121783"/>
       </p:ext>
     </p:extLst>
   </p:cSld>
@@ -7910,7 +7910,7 @@
     </p:spTree>
     <p:extLst>
       <p:ext uri="{BB962C8B-B14F-4D97-AF65-F5344CB8AC3E}">
-        <p14:creationId xmlns:p14="http://schemas.microsoft.com/office/powerpoint/2010/main" val="2998683113"/>
+        <p14:creationId xmlns:p14="http://schemas.microsoft.com/office/powerpoint/2010/main" xmlns="" val="2998683113"/>
       </p:ext>
     </p:extLst>
   </p:cSld>
@@ -8196,7 +8196,7 @@
     </p:spTree>
     <p:extLst>
       <p:ext uri="{BB962C8B-B14F-4D97-AF65-F5344CB8AC3E}">
-        <p14:creationId xmlns:p14="http://schemas.microsoft.com/office/powerpoint/2010/main" val="2520885632"/>
+        <p14:creationId xmlns:p14="http://schemas.microsoft.com/office/powerpoint/2010/main" xmlns="" val="2520885632"/>
       </p:ext>
     </p:extLst>
   </p:cSld>
@@ -8398,7 +8398,7 @@
     </p:spTree>
     <p:extLst>
       <p:ext uri="{BB962C8B-B14F-4D97-AF65-F5344CB8AC3E}">
-        <p14:creationId xmlns:p14="http://schemas.microsoft.com/office/powerpoint/2010/main" val="2388575331"/>
+        <p14:creationId xmlns:p14="http://schemas.microsoft.com/office/powerpoint/2010/main" xmlns="" val="2388575331"/>
       </p:ext>
     </p:extLst>
   </p:cSld>
@@ -9522,7 +9522,7 @@
           <p:cNvPr id="22" name="Picture 21">
             <a:extLst>
               <a:ext uri="{FF2B5EF4-FFF2-40B4-BE49-F238E27FC236}">
-                <a16:creationId xmlns:a16="http://schemas.microsoft.com/office/drawing/2014/main" xmlns="" id="{D2C70A87-6824-3248-B448-307E7C5BC0C9}"/>
+                <a16:creationId xmlns="" xmlns:a16="http://schemas.microsoft.com/office/drawing/2014/main" id="{D2C70A87-6824-3248-B448-307E7C5BC0C9}"/>
               </a:ext>
             </a:extLst>
           </p:cNvPr>
@@ -9532,7 +9532,7 @@
           <p:nvPr userDrawn="1"/>
         </p:nvPicPr>
         <p:blipFill>
-          <a:blip r:embed="rId2"/>
+          <a:blip r:embed="rId2" cstate="print"/>
           <a:stretch>
             <a:fillRect/>
           </a:stretch>
@@ -9550,7 +9550,7 @@
     </p:spTree>
     <p:extLst>
       <p:ext uri="{BB962C8B-B14F-4D97-AF65-F5344CB8AC3E}">
-        <p14:creationId xmlns:p14="http://schemas.microsoft.com/office/powerpoint/2010/main" val="983028899"/>
+        <p14:creationId xmlns:p14="http://schemas.microsoft.com/office/powerpoint/2010/main" xmlns="" val="983028899"/>
       </p:ext>
     </p:extLst>
   </p:cSld>
@@ -9738,7 +9738,7 @@
     </p:spTree>
     <p:extLst>
       <p:ext uri="{BB962C8B-B14F-4D97-AF65-F5344CB8AC3E}">
-        <p14:creationId xmlns:p14="http://schemas.microsoft.com/office/powerpoint/2010/main" val="151151279"/>
+        <p14:creationId xmlns:p14="http://schemas.microsoft.com/office/powerpoint/2010/main" xmlns="" val="151151279"/>
       </p:ext>
     </p:extLst>
   </p:cSld>
@@ -9907,7 +9907,7 @@
     </p:spTree>
     <p:extLst>
       <p:ext uri="{BB962C8B-B14F-4D97-AF65-F5344CB8AC3E}">
-        <p14:creationId xmlns:p14="http://schemas.microsoft.com/office/powerpoint/2010/main" val="1155045519"/>
+        <p14:creationId xmlns:p14="http://schemas.microsoft.com/office/powerpoint/2010/main" xmlns="" val="1155045519"/>
       </p:ext>
     </p:extLst>
   </p:cSld>
@@ -9958,7 +9958,7 @@
           <p:cNvPr id="9" name="Picture 8">
             <a:extLst>
               <a:ext uri="{FF2B5EF4-FFF2-40B4-BE49-F238E27FC236}">
-                <a16:creationId xmlns:a16="http://schemas.microsoft.com/office/drawing/2014/main" xmlns="" id="{21C47469-3B03-E44C-89B5-F697BC2200BB}"/>
+                <a16:creationId xmlns="" xmlns:a16="http://schemas.microsoft.com/office/drawing/2014/main" id="{21C47469-3B03-E44C-89B5-F697BC2200BB}"/>
               </a:ext>
             </a:extLst>
           </p:cNvPr>
@@ -9968,7 +9968,7 @@
           <p:nvPr userDrawn="1"/>
         </p:nvPicPr>
         <p:blipFill>
-          <a:blip r:embed="rId2"/>
+          <a:blip r:embed="rId2" cstate="print"/>
           <a:stretch>
             <a:fillRect/>
           </a:stretch>
@@ -9986,7 +9986,7 @@
     </p:spTree>
     <p:extLst>
       <p:ext uri="{BB962C8B-B14F-4D97-AF65-F5344CB8AC3E}">
-        <p14:creationId xmlns:p14="http://schemas.microsoft.com/office/powerpoint/2010/main" val="4132872435"/>
+        <p14:creationId xmlns:p14="http://schemas.microsoft.com/office/powerpoint/2010/main" xmlns="" val="4132872435"/>
       </p:ext>
     </p:extLst>
   </p:cSld>
@@ -10277,7 +10277,7 @@
     </p:spTree>
     <p:extLst>
       <p:ext uri="{BB962C8B-B14F-4D97-AF65-F5344CB8AC3E}">
-        <p14:creationId xmlns:p14="http://schemas.microsoft.com/office/powerpoint/2010/main" val="1167914684"/>
+        <p14:creationId xmlns:p14="http://schemas.microsoft.com/office/powerpoint/2010/main" xmlns="" val="1167914684"/>
       </p:ext>
     </p:extLst>
   </p:cSld>
@@ -10671,7 +10671,7 @@
     </p:spTree>
     <p:extLst>
       <p:ext uri="{BB962C8B-B14F-4D97-AF65-F5344CB8AC3E}">
-        <p14:creationId xmlns:p14="http://schemas.microsoft.com/office/powerpoint/2010/main" val="157743967"/>
+        <p14:creationId xmlns:p14="http://schemas.microsoft.com/office/powerpoint/2010/main" xmlns="" val="157743967"/>
       </p:ext>
     </p:extLst>
   </p:cSld>
@@ -10959,7 +10959,7 @@
     </p:spTree>
     <p:extLst>
       <p:ext uri="{BB962C8B-B14F-4D97-AF65-F5344CB8AC3E}">
-        <p14:creationId xmlns:p14="http://schemas.microsoft.com/office/powerpoint/2010/main" val="3179948078"/>
+        <p14:creationId xmlns:p14="http://schemas.microsoft.com/office/powerpoint/2010/main" xmlns="" val="3179948078"/>
       </p:ext>
     </p:extLst>
   </p:cSld>
@@ -11000,7 +11000,7 @@
           <p:nvPr userDrawn="1"/>
         </p:nvPicPr>
         <p:blipFill>
-          <a:blip r:embed="rId14"/>
+          <a:blip r:embed="rId14" cstate="print"/>
           <a:stretch>
             <a:fillRect/>
           </a:stretch>
@@ -11018,7 +11018,7 @@
     </p:spTree>
     <p:extLst>
       <p:ext uri="{BB962C8B-B14F-4D97-AF65-F5344CB8AC3E}">
-        <p14:creationId xmlns:p14="http://schemas.microsoft.com/office/powerpoint/2010/main" val="3674229508"/>
+        <p14:creationId xmlns:p14="http://schemas.microsoft.com/office/powerpoint/2010/main" xmlns="" val="3674229508"/>
       </p:ext>
     </p:extLst>
   </p:cSld>
@@ -11319,7 +11319,7 @@
   </p:txStyles>
   <p:extLst>
     <p:ext uri="{27BBF7A9-308A-43DC-89C8-2F10F3537804}">
-      <p15:sldGuideLst xmlns:p15="http://schemas.microsoft.com/office/powerpoint/2012/main" xmlns="">
+      <p15:sldGuideLst xmlns="" xmlns:p15="http://schemas.microsoft.com/office/powerpoint/2012/main">
         <p15:guide id="1" orient="horz" pos="2160">
           <p15:clr>
             <a:srgbClr val="F26B43"/>
@@ -11477,7 +11477,7 @@
           <p:nvPr userDrawn="1"/>
         </p:nvPicPr>
         <p:blipFill>
-          <a:blip r:embed="rId13"/>
+          <a:blip r:embed="rId13" cstate="print"/>
           <a:stretch>
             <a:fillRect/>
           </a:stretch>
@@ -11495,7 +11495,7 @@
     </p:spTree>
     <p:extLst>
       <p:ext uri="{BB962C8B-B14F-4D97-AF65-F5344CB8AC3E}">
-        <p14:creationId xmlns:p14="http://schemas.microsoft.com/office/powerpoint/2010/main" val="341790936"/>
+        <p14:creationId xmlns:p14="http://schemas.microsoft.com/office/powerpoint/2010/main" xmlns="" val="341790936"/>
       </p:ext>
     </p:extLst>
   </p:cSld>
@@ -11795,7 +11795,7 @@
   </p:txStyles>
   <p:extLst>
     <p:ext uri="{27BBF7A9-308A-43DC-89C8-2F10F3537804}">
-      <p15:sldGuideLst xmlns:p15="http://schemas.microsoft.com/office/powerpoint/2012/main" xmlns="">
+      <p15:sldGuideLst xmlns="" xmlns:p15="http://schemas.microsoft.com/office/powerpoint/2012/main">
         <p15:guide id="1" orient="horz" pos="2160">
           <p15:clr>
             <a:srgbClr val="F26B43"/>
@@ -11953,7 +11953,7 @@
           <p:nvPr userDrawn="1"/>
         </p:nvPicPr>
         <p:blipFill>
-          <a:blip r:embed="rId13"/>
+          <a:blip r:embed="rId13" cstate="print"/>
           <a:stretch>
             <a:fillRect/>
           </a:stretch>
@@ -11971,7 +11971,7 @@
     </p:spTree>
     <p:extLst>
       <p:ext uri="{BB962C8B-B14F-4D97-AF65-F5344CB8AC3E}">
-        <p14:creationId xmlns:p14="http://schemas.microsoft.com/office/powerpoint/2010/main" val="3849270835"/>
+        <p14:creationId xmlns:p14="http://schemas.microsoft.com/office/powerpoint/2010/main" xmlns="" val="3849270835"/>
       </p:ext>
     </p:extLst>
   </p:cSld>
@@ -12271,7 +12271,7 @@
   </p:txStyles>
   <p:extLst>
     <p:ext uri="{27BBF7A9-308A-43DC-89C8-2F10F3537804}">
-      <p15:sldGuideLst xmlns:p15="http://schemas.microsoft.com/office/powerpoint/2012/main" xmlns="">
+      <p15:sldGuideLst xmlns="" xmlns:p15="http://schemas.microsoft.com/office/powerpoint/2012/main">
         <p15:guide id="1" orient="horz" pos="2160">
           <p15:clr>
             <a:srgbClr val="F26B43"/>
@@ -12420,7 +12420,7 @@
           <p:cNvPr id="4" name="Text Placeholder 3">
             <a:extLst>
               <a:ext uri="{FF2B5EF4-FFF2-40B4-BE49-F238E27FC236}">
-                <a16:creationId xmlns:a16="http://schemas.microsoft.com/office/drawing/2014/main" xmlns="" id="{C6BFCD7C-0C79-467A-9369-0675D4B541D4}"/>
+                <a16:creationId xmlns="" xmlns:a16="http://schemas.microsoft.com/office/drawing/2014/main" id="{C6BFCD7C-0C79-467A-9369-0675D4B541D4}"/>
               </a:ext>
             </a:extLst>
           </p:cNvPr>
@@ -12471,7 +12471,7 @@
           <p:cNvPr id="2" name="Title 1">
             <a:extLst>
               <a:ext uri="{FF2B5EF4-FFF2-40B4-BE49-F238E27FC236}">
-                <a16:creationId xmlns:a16="http://schemas.microsoft.com/office/drawing/2014/main" xmlns="" id="{3F314A52-F715-4894-9739-384FC3085337}"/>
+                <a16:creationId xmlns="" xmlns:a16="http://schemas.microsoft.com/office/drawing/2014/main" id="{3F314A52-F715-4894-9739-384FC3085337}"/>
               </a:ext>
             </a:extLst>
           </p:cNvPr>
@@ -12559,7 +12559,7 @@
     </p:spTree>
     <p:extLst>
       <p:ext uri="{BB962C8B-B14F-4D97-AF65-F5344CB8AC3E}">
-        <p14:creationId xmlns:p14="http://schemas.microsoft.com/office/powerpoint/2010/main" val="4001193277"/>
+        <p14:creationId xmlns:p14="http://schemas.microsoft.com/office/powerpoint/2010/main" xmlns="" val="4001193277"/>
       </p:ext>
     </p:extLst>
   </p:cSld>
@@ -12733,10 +12733,10 @@
           <p:nvPr/>
         </p:nvPicPr>
         <p:blipFill>
-          <a:blip r:embed="rId2">
+          <a:blip r:embed="rId2" cstate="print">
             <a:extLst>
               <a:ext uri="{28A0092B-C50C-407E-A947-70E740481C1C}">
-                <a14:useLocalDpi xmlns:a14="http://schemas.microsoft.com/office/drawing/2010/main" val="0"/>
+                <a14:useLocalDpi xmlns:a14="http://schemas.microsoft.com/office/drawing/2010/main" xmlns="" val="0"/>
               </a:ext>
             </a:extLst>
           </a:blip>
@@ -12757,7 +12757,7 @@
     </p:spTree>
     <p:extLst>
       <p:ext uri="{BB962C8B-B14F-4D97-AF65-F5344CB8AC3E}">
-        <p14:creationId xmlns:p14="http://schemas.microsoft.com/office/powerpoint/2010/main" val="3412305969"/>
+        <p14:creationId xmlns:p14="http://schemas.microsoft.com/office/powerpoint/2010/main" xmlns="" val="3412305969"/>
       </p:ext>
     </p:extLst>
   </p:cSld>
@@ -12836,10 +12836,10 @@
           <p:nvPr/>
         </p:nvPicPr>
         <p:blipFill>
-          <a:blip r:embed="rId2">
+          <a:blip r:embed="rId2" cstate="print">
             <a:extLst>
               <a:ext uri="{28A0092B-C50C-407E-A947-70E740481C1C}">
-                <a14:useLocalDpi xmlns:a14="http://schemas.microsoft.com/office/drawing/2010/main" val="0"/>
+                <a14:useLocalDpi xmlns:a14="http://schemas.microsoft.com/office/drawing/2010/main" xmlns="" val="0"/>
               </a:ext>
             </a:extLst>
           </a:blip>
@@ -12900,10 +12900,10 @@
           <p:nvPr/>
         </p:nvPicPr>
         <p:blipFill>
-          <a:blip r:embed="rId3">
+          <a:blip r:embed="rId3" cstate="print">
             <a:extLst>
               <a:ext uri="{28A0092B-C50C-407E-A947-70E740481C1C}">
-                <a14:useLocalDpi xmlns:a14="http://schemas.microsoft.com/office/drawing/2010/main" val="0"/>
+                <a14:useLocalDpi xmlns:a14="http://schemas.microsoft.com/office/drawing/2010/main" xmlns="" val="0"/>
               </a:ext>
             </a:extLst>
           </a:blip>
@@ -12924,7 +12924,7 @@
     </p:spTree>
     <p:extLst>
       <p:ext uri="{BB962C8B-B14F-4D97-AF65-F5344CB8AC3E}">
-        <p14:creationId xmlns:p14="http://schemas.microsoft.com/office/powerpoint/2010/main" val="1964972961"/>
+        <p14:creationId xmlns:p14="http://schemas.microsoft.com/office/powerpoint/2010/main" xmlns="" val="1964972961"/>
       </p:ext>
     </p:extLst>
   </p:cSld>
@@ -13051,7 +13051,7 @@
     </p:spTree>
     <p:extLst>
       <p:ext uri="{BB962C8B-B14F-4D97-AF65-F5344CB8AC3E}">
-        <p14:creationId xmlns:p14="http://schemas.microsoft.com/office/powerpoint/2010/main" val="2942944996"/>
+        <p14:creationId xmlns:p14="http://schemas.microsoft.com/office/powerpoint/2010/main" xmlns="" val="2942944996"/>
       </p:ext>
     </p:extLst>
   </p:cSld>
@@ -13138,10 +13138,10 @@
           <p:nvPr/>
         </p:nvPicPr>
         <p:blipFill>
-          <a:blip r:embed="rId2">
+          <a:blip r:embed="rId2" cstate="print">
             <a:extLst>
               <a:ext uri="{28A0092B-C50C-407E-A947-70E740481C1C}">
-                <a14:useLocalDpi xmlns:a14="http://schemas.microsoft.com/office/drawing/2010/main" val="0"/>
+                <a14:useLocalDpi xmlns:a14="http://schemas.microsoft.com/office/drawing/2010/main" xmlns="" val="0"/>
               </a:ext>
             </a:extLst>
           </a:blip>
@@ -13168,10 +13168,10 @@
           <p:nvPr/>
         </p:nvPicPr>
         <p:blipFill>
-          <a:blip r:embed="rId3">
+          <a:blip r:embed="rId3" cstate="print">
             <a:extLst>
               <a:ext uri="{28A0092B-C50C-407E-A947-70E740481C1C}">
-                <a14:useLocalDpi xmlns:a14="http://schemas.microsoft.com/office/drawing/2010/main" val="0"/>
+                <a14:useLocalDpi xmlns:a14="http://schemas.microsoft.com/office/drawing/2010/main" xmlns="" val="0"/>
               </a:ext>
             </a:extLst>
           </a:blip>
@@ -13344,7 +13344,7 @@
     </p:spTree>
     <p:extLst>
       <p:ext uri="{BB962C8B-B14F-4D97-AF65-F5344CB8AC3E}">
-        <p14:creationId xmlns:p14="http://schemas.microsoft.com/office/powerpoint/2010/main" val="20840402"/>
+        <p14:creationId xmlns:p14="http://schemas.microsoft.com/office/powerpoint/2010/main" xmlns="" val="20840402"/>
       </p:ext>
     </p:extLst>
   </p:cSld>
@@ -13400,12 +13400,16 @@
           <a:p>
             <a:pPr algn="ctr" fontAlgn="base"/>
             <a:r>
-              <a:rPr lang="en-US" b="1" dirty="0"/>
+              <a:rPr lang="en-US" sz="3200" b="1" dirty="0"/>
               <a:t>ROW_NUMBER</a:t>
             </a:r>
             <a:r>
+              <a:rPr lang="en-US" sz="3200" b="1" dirty="0" smtClean="0"/>
+              <a:t>()   function</a:t>
+            </a:r>
+            <a:r>
               <a:rPr lang="en-US" b="1" dirty="0" smtClean="0"/>
-              <a:t>()   function</a:t>
+              <a:t/>
             </a:r>
             <a:br>
               <a:rPr lang="en-US" b="1" dirty="0" smtClean="0"/>
@@ -13423,10 +13427,10 @@
           <p:nvPr/>
         </p:nvPicPr>
         <p:blipFill>
-          <a:blip r:embed="rId2">
+          <a:blip r:embed="rId2" cstate="print">
             <a:extLst>
               <a:ext uri="{28A0092B-C50C-407E-A947-70E740481C1C}">
-                <a14:useLocalDpi xmlns:a14="http://schemas.microsoft.com/office/drawing/2010/main" val="0"/>
+                <a14:useLocalDpi xmlns:a14="http://schemas.microsoft.com/office/drawing/2010/main" xmlns="" val="0"/>
               </a:ext>
             </a:extLst>
           </a:blip>
@@ -13436,8 +13440,8 @@
         </p:blipFill>
         <p:spPr>
           <a:xfrm>
-            <a:off x="1409701" y="1346231"/>
-            <a:ext cx="9277349" cy="4444970"/>
+            <a:off x="1847850" y="1593880"/>
+            <a:ext cx="8760463" cy="4197320"/>
           </a:xfrm>
           <a:prstGeom prst="rect">
             <a:avLst/>
@@ -13452,8 +13456,8 @@
         </p:nvSpPr>
         <p:spPr>
           <a:xfrm>
-            <a:off x="1409701" y="5791200"/>
-            <a:ext cx="8572500" cy="830997"/>
+            <a:off x="228600" y="5829300"/>
+            <a:ext cx="9601200" cy="707886"/>
           </a:xfrm>
           <a:prstGeom prst="rect">
             <a:avLst/>
@@ -13468,42 +13472,42 @@
           <a:p>
             <a:pPr algn="just"/>
             <a:r>
-              <a:rPr lang="en-US" sz="2400" dirty="0" smtClean="0"/>
+              <a:rPr lang="en-US" sz="2000" dirty="0" smtClean="0"/>
               <a:t>SELECT </a:t>
             </a:r>
             <a:r>
-              <a:rPr lang="en-US" sz="2400" dirty="0"/>
+              <a:rPr lang="en-US" sz="2000" dirty="0"/>
               <a:t>*, ROW_NUMBER() OVER(PARTITION BY </a:t>
             </a:r>
             <a:r>
-              <a:rPr lang="en-US" sz="2400" dirty="0" err="1"/>
+              <a:rPr lang="en-US" sz="2000" dirty="0" err="1"/>
               <a:t>CTE_Employees.CityName</a:t>
             </a:r>
-            <a:endParaRPr lang="en-US" sz="2400" dirty="0"/>
+            <a:endParaRPr lang="en-US" sz="2000" dirty="0"/>
           </a:p>
           <a:p>
             <a:pPr algn="just"/>
             <a:r>
-              <a:rPr lang="en-US" sz="2400" dirty="0"/>
+              <a:rPr lang="en-US" sz="2000" dirty="0"/>
               <a:t>ORDER BY </a:t>
             </a:r>
             <a:r>
-              <a:rPr lang="en-US" sz="2400" dirty="0" err="1"/>
+              <a:rPr lang="en-US" sz="2000" dirty="0" err="1"/>
               <a:t>CTE_Employees.CityName</a:t>
             </a:r>
             <a:r>
-              <a:rPr lang="en-US" sz="2400" dirty="0"/>
+              <a:rPr lang="en-US" sz="2000" dirty="0"/>
               <a:t>) AS [Count] </a:t>
             </a:r>
             <a:r>
-              <a:rPr lang="en-US" sz="2400" dirty="0" smtClean="0"/>
+              <a:rPr lang="en-US" sz="2000" dirty="0" smtClean="0"/>
               <a:t> FROM </a:t>
             </a:r>
             <a:r>
-              <a:rPr lang="en-US" sz="2400" dirty="0" err="1"/>
+              <a:rPr lang="en-US" sz="2000" dirty="0" err="1"/>
               <a:t>CTE_Employees</a:t>
             </a:r>
-            <a:endParaRPr lang="ru-RU" sz="2400" dirty="0"/>
+            <a:endParaRPr lang="ru-RU" sz="2000" dirty="0"/>
           </a:p>
         </p:txBody>
       </p:sp>
@@ -13515,8 +13519,8 @@
         </p:nvSpPr>
         <p:spPr>
           <a:xfrm>
-            <a:off x="0" y="685800"/>
-            <a:ext cx="12191999" cy="984885"/>
+            <a:off x="0" y="628650"/>
+            <a:ext cx="12192000" cy="1477328"/>
           </a:xfrm>
           <a:prstGeom prst="rect">
             <a:avLst/>
@@ -13530,42 +13534,38 @@
           <a:lstStyle/>
           <a:p>
             <a:r>
-              <a:rPr lang="en-US" sz="2000" dirty="0"/>
+              <a:rPr lang="en-US" dirty="0"/>
               <a:t>The name is self-explanatory. These functions assign a unique row number to each </a:t>
             </a:r>
             <a:r>
-              <a:rPr lang="en-US" sz="2000" dirty="0" smtClean="0"/>
+              <a:rPr lang="en-US" dirty="0" smtClean="0"/>
               <a:t>record. The </a:t>
             </a:r>
             <a:r>
-              <a:rPr lang="en-US" sz="2000" dirty="0"/>
+              <a:rPr lang="en-US" dirty="0"/>
               <a:t>row number will be reset </a:t>
             </a:r>
             <a:r>
-              <a:rPr lang="en-US" sz="2000" dirty="0" smtClean="0"/>
+              <a:rPr lang="en-US" dirty="0" smtClean="0"/>
               <a:t>for each </a:t>
             </a:r>
           </a:p>
           <a:p>
             <a:r>
-              <a:rPr lang="en-US" sz="2000" dirty="0" smtClean="0"/>
+              <a:rPr lang="en-US" dirty="0" smtClean="0"/>
               <a:t>partition </a:t>
             </a:r>
             <a:r>
-              <a:rPr lang="en-US" sz="2000" dirty="0"/>
+              <a:rPr lang="en-US" dirty="0"/>
               <a:t>if </a:t>
             </a:r>
             <a:r>
-              <a:rPr lang="en-US" sz="2000" dirty="0" smtClean="0"/>
+              <a:rPr lang="en-US" dirty="0" smtClean="0"/>
               <a:t>PARTITION </a:t>
             </a:r>
             <a:r>
-              <a:rPr lang="en-US" sz="2000" dirty="0"/>
+              <a:rPr lang="en-US" dirty="0"/>
               <a:t>BY is specified. Let’s see how ROW_NUMBER() works without PARTITION BY and then with PARTITION BY.</a:t>
-            </a:r>
-            <a:r>
-              <a:rPr lang="en-US" dirty="0"/>
-              <a:t/>
             </a:r>
             <a:br>
               <a:rPr lang="en-US" dirty="0"/>
@@ -13577,7 +13577,7 @@
     </p:spTree>
     <p:extLst>
       <p:ext uri="{BB962C8B-B14F-4D97-AF65-F5344CB8AC3E}">
-        <p14:creationId xmlns:p14="http://schemas.microsoft.com/office/powerpoint/2010/main" val="1687682637"/>
+        <p14:creationId xmlns:p14="http://schemas.microsoft.com/office/powerpoint/2010/main" xmlns="" val="1687682637"/>
       </p:ext>
     </p:extLst>
   </p:cSld>
@@ -13873,8 +13873,8 @@
         </p:nvSpPr>
         <p:spPr>
           <a:xfrm>
-            <a:off x="2743200" y="381001"/>
-            <a:ext cx="6991350" cy="685800"/>
+            <a:off x="952500" y="381001"/>
+            <a:ext cx="10001250" cy="685800"/>
           </a:xfrm>
         </p:spPr>
         <p:txBody>
@@ -13901,10 +13901,10 @@
           <p:nvPr/>
         </p:nvPicPr>
         <p:blipFill>
-          <a:blip r:embed="rId2">
+          <a:blip r:embed="rId2" cstate="print">
             <a:extLst>
               <a:ext uri="{28A0092B-C50C-407E-A947-70E740481C1C}">
-                <a14:useLocalDpi xmlns:a14="http://schemas.microsoft.com/office/drawing/2010/main" val="0"/>
+                <a14:useLocalDpi xmlns:a14="http://schemas.microsoft.com/office/drawing/2010/main" xmlns="" val="0"/>
               </a:ext>
             </a:extLst>
           </a:blip>
@@ -13925,7 +13925,7 @@
     </p:spTree>
     <p:extLst>
       <p:ext uri="{BB962C8B-B14F-4D97-AF65-F5344CB8AC3E}">
-        <p14:creationId xmlns:p14="http://schemas.microsoft.com/office/powerpoint/2010/main" val="2338759316"/>
+        <p14:creationId xmlns:p14="http://schemas.microsoft.com/office/powerpoint/2010/main" xmlns="" val="2338759316"/>
       </p:ext>
     </p:extLst>
   </p:cSld>
@@ -14191,10 +14191,10 @@
           <p:nvPr/>
         </p:nvPicPr>
         <p:blipFill>
-          <a:blip r:embed="rId2">
+          <a:blip r:embed="rId2" cstate="print">
             <a:extLst>
               <a:ext uri="{28A0092B-C50C-407E-A947-70E740481C1C}">
-                <a14:useLocalDpi xmlns:a14="http://schemas.microsoft.com/office/drawing/2010/main" val="0"/>
+                <a14:useLocalDpi xmlns:a14="http://schemas.microsoft.com/office/drawing/2010/main" xmlns="" val="0"/>
               </a:ext>
             </a:extLst>
           </a:blip>
@@ -14204,7 +14204,7 @@
         </p:blipFill>
         <p:spPr>
           <a:xfrm>
-            <a:off x="609599" y="1707173"/>
+            <a:off x="723899" y="2392973"/>
             <a:ext cx="10801351" cy="4154366"/>
           </a:xfrm>
           <a:prstGeom prst="rect">
@@ -14215,7 +14215,7 @@
     </p:spTree>
     <p:extLst>
       <p:ext uri="{BB962C8B-B14F-4D97-AF65-F5344CB8AC3E}">
-        <p14:creationId xmlns:p14="http://schemas.microsoft.com/office/powerpoint/2010/main" val="4216190724"/>
+        <p14:creationId xmlns:p14="http://schemas.microsoft.com/office/powerpoint/2010/main" xmlns="" val="4216190724"/>
       </p:ext>
     </p:extLst>
   </p:cSld>
@@ -14464,10 +14464,10 @@
           <p:nvPr/>
         </p:nvPicPr>
         <p:blipFill>
-          <a:blip r:embed="rId2">
+          <a:blip r:embed="rId2" cstate="print">
             <a:extLst>
               <a:ext uri="{28A0092B-C50C-407E-A947-70E740481C1C}">
-                <a14:useLocalDpi xmlns:a14="http://schemas.microsoft.com/office/drawing/2010/main" val="0"/>
+                <a14:useLocalDpi xmlns:a14="http://schemas.microsoft.com/office/drawing/2010/main" xmlns="" val="0"/>
               </a:ext>
             </a:extLst>
           </a:blip>
@@ -14477,7 +14477,7 @@
         </p:blipFill>
         <p:spPr>
           <a:xfrm>
-            <a:off x="971550" y="1627198"/>
+            <a:off x="571500" y="2217748"/>
             <a:ext cx="8991600" cy="4148442"/>
           </a:xfrm>
           <a:prstGeom prst="rect">
@@ -14488,7 +14488,7 @@
     </p:spTree>
     <p:extLst>
       <p:ext uri="{BB962C8B-B14F-4D97-AF65-F5344CB8AC3E}">
-        <p14:creationId xmlns:p14="http://schemas.microsoft.com/office/powerpoint/2010/main" val="1686655173"/>
+        <p14:creationId xmlns:p14="http://schemas.microsoft.com/office/powerpoint/2010/main" xmlns="" val="1686655173"/>
       </p:ext>
     </p:extLst>
   </p:cSld>
@@ -14732,10 +14732,10 @@
           <p:nvPr/>
         </p:nvPicPr>
         <p:blipFill>
-          <a:blip r:embed="rId2">
+          <a:blip r:embed="rId2" cstate="print">
             <a:extLst>
               <a:ext uri="{28A0092B-C50C-407E-A947-70E740481C1C}">
-                <a14:useLocalDpi xmlns:a14="http://schemas.microsoft.com/office/drawing/2010/main" val="0"/>
+                <a14:useLocalDpi xmlns:a14="http://schemas.microsoft.com/office/drawing/2010/main" xmlns="" val="0"/>
               </a:ext>
             </a:extLst>
           </a:blip>
@@ -14745,7 +14745,7 @@
         </p:blipFill>
         <p:spPr>
           <a:xfrm>
-            <a:off x="209551" y="2126346"/>
+            <a:off x="476251" y="2202546"/>
             <a:ext cx="9582149" cy="3932047"/>
           </a:xfrm>
           <a:prstGeom prst="rect">
@@ -14756,7 +14756,7 @@
     </p:spTree>
     <p:extLst>
       <p:ext uri="{BB962C8B-B14F-4D97-AF65-F5344CB8AC3E}">
-        <p14:creationId xmlns:p14="http://schemas.microsoft.com/office/powerpoint/2010/main" val="2060662766"/>
+        <p14:creationId xmlns:p14="http://schemas.microsoft.com/office/powerpoint/2010/main" xmlns="" val="2060662766"/>
       </p:ext>
     </p:extLst>
   </p:cSld>
@@ -14802,8 +14802,8 @@
         </p:nvSpPr>
         <p:spPr>
           <a:xfrm>
-            <a:off x="685800" y="171451"/>
-            <a:ext cx="10820400" cy="1047750"/>
+            <a:off x="590550" y="171451"/>
+            <a:ext cx="10877550" cy="1047750"/>
           </a:xfrm>
         </p:spPr>
         <p:txBody>
@@ -14811,10 +14811,10 @@
           <a:lstStyle/>
           <a:p>
             <a:r>
-              <a:rPr lang="en-US" dirty="0" smtClean="0"/>
+              <a:rPr lang="en-US" sz="3600" dirty="0" smtClean="0"/>
               <a:t>Using GROUP BY And Window functions together</a:t>
             </a:r>
-            <a:endParaRPr lang="ru-RU" dirty="0"/>
+            <a:endParaRPr lang="ru-RU" sz="3600" dirty="0"/>
           </a:p>
         </p:txBody>
       </p:sp>
@@ -14826,8 +14826,8 @@
         </p:nvSpPr>
         <p:spPr>
           <a:xfrm>
-            <a:off x="95250" y="704850"/>
-            <a:ext cx="11906250" cy="830997"/>
+            <a:off x="0" y="571500"/>
+            <a:ext cx="12096750" cy="1015663"/>
           </a:xfrm>
           <a:prstGeom prst="rect">
             <a:avLst/>
@@ -14841,24 +14841,24 @@
           <a:lstStyle/>
           <a:p>
             <a:r>
-              <a:rPr lang="en-US" sz="2400" dirty="0" smtClean="0"/>
+              <a:rPr lang="en-US" sz="2000" dirty="0" smtClean="0"/>
               <a:t>When you try execute </a:t>
             </a:r>
             <a:r>
-              <a:rPr lang="en-US" sz="2400" dirty="0"/>
+              <a:rPr lang="en-US" sz="2000" dirty="0"/>
               <a:t>GROUP BY And Window functions </a:t>
             </a:r>
             <a:r>
-              <a:rPr lang="en-US" sz="2400" dirty="0" smtClean="0"/>
+              <a:rPr lang="en-US" sz="2000" dirty="0" smtClean="0"/>
               <a:t> in one table you will  get an error. </a:t>
             </a:r>
           </a:p>
           <a:p>
             <a:r>
-              <a:rPr lang="en-US" sz="2400" dirty="0" smtClean="0"/>
+              <a:rPr lang="en-US" sz="2000" dirty="0" smtClean="0"/>
               <a:t>If you want to use them together you can Use a lot  of ways such as CTE, derived tables etc. For  example</a:t>
             </a:r>
-            <a:endParaRPr lang="ru-RU" sz="2400" dirty="0"/>
+            <a:endParaRPr lang="ru-RU" sz="2000" dirty="0"/>
           </a:p>
         </p:txBody>
       </p:sp>
@@ -14870,8 +14870,8 @@
         </p:nvSpPr>
         <p:spPr>
           <a:xfrm>
-            <a:off x="95250" y="1535847"/>
-            <a:ext cx="12096750" cy="5078313"/>
+            <a:off x="0" y="1502688"/>
+            <a:ext cx="12096750" cy="5355312"/>
           </a:xfrm>
           <a:prstGeom prst="rect">
             <a:avLst/>
@@ -15222,7 +15222,7 @@
     </p:spTree>
     <p:extLst>
       <p:ext uri="{BB962C8B-B14F-4D97-AF65-F5344CB8AC3E}">
-        <p14:creationId xmlns:p14="http://schemas.microsoft.com/office/powerpoint/2010/main" val="1018178543"/>
+        <p14:creationId xmlns:p14="http://schemas.microsoft.com/office/powerpoint/2010/main" xmlns="" val="1018178543"/>
       </p:ext>
     </p:extLst>
   </p:cSld>
@@ -15261,7 +15261,7 @@
           <p:cNvPr id="6" name="Title 5">
             <a:extLst>
               <a:ext uri="{FF2B5EF4-FFF2-40B4-BE49-F238E27FC236}">
-                <a16:creationId xmlns:a16="http://schemas.microsoft.com/office/drawing/2014/main" xmlns="" id="{C26BA086-93B2-44A2-8B1B-22E693D2ABB6}"/>
+                <a16:creationId xmlns="" xmlns:a16="http://schemas.microsoft.com/office/drawing/2014/main" id="{C26BA086-93B2-44A2-8B1B-22E693D2ABB6}"/>
               </a:ext>
             </a:extLst>
           </p:cNvPr>
@@ -15308,7 +15308,7 @@
           <p:cNvPr id="7" name="Text Placeholder 6">
             <a:extLst>
               <a:ext uri="{FF2B5EF4-FFF2-40B4-BE49-F238E27FC236}">
-                <a16:creationId xmlns:a16="http://schemas.microsoft.com/office/drawing/2014/main" xmlns="" id="{B3EDC24C-EE02-4845-99B9-F77A9B3BC1BB}"/>
+                <a16:creationId xmlns="" xmlns:a16="http://schemas.microsoft.com/office/drawing/2014/main" id="{B3EDC24C-EE02-4845-99B9-F77A9B3BC1BB}"/>
               </a:ext>
             </a:extLst>
           </p:cNvPr>
@@ -15425,7 +15425,7 @@
     </p:spTree>
     <p:extLst>
       <p:ext uri="{BB962C8B-B14F-4D97-AF65-F5344CB8AC3E}">
-        <p14:creationId xmlns:p14="http://schemas.microsoft.com/office/powerpoint/2010/main" val="759534034"/>
+        <p14:creationId xmlns:p14="http://schemas.microsoft.com/office/powerpoint/2010/main" xmlns="" val="759534034"/>
       </p:ext>
     </p:extLst>
   </p:cSld>
@@ -15591,10 +15591,10 @@
           <p:nvPr/>
         </p:nvPicPr>
         <p:blipFill>
-          <a:blip r:embed="rId2">
+          <a:blip r:embed="rId2" cstate="print">
             <a:extLst>
               <a:ext uri="{28A0092B-C50C-407E-A947-70E740481C1C}">
-                <a14:useLocalDpi xmlns:a14="http://schemas.microsoft.com/office/drawing/2010/main" val="0"/>
+                <a14:useLocalDpi xmlns:a14="http://schemas.microsoft.com/office/drawing/2010/main" xmlns="" val="0"/>
               </a:ext>
             </a:extLst>
           </a:blip>
@@ -15615,7 +15615,7 @@
     </p:spTree>
     <p:extLst>
       <p:ext uri="{BB962C8B-B14F-4D97-AF65-F5344CB8AC3E}">
-        <p14:creationId xmlns:p14="http://schemas.microsoft.com/office/powerpoint/2010/main" val="1069516218"/>
+        <p14:creationId xmlns:p14="http://schemas.microsoft.com/office/powerpoint/2010/main" xmlns="" val="1069516218"/>
       </p:ext>
     </p:extLst>
   </p:cSld>
@@ -15775,7 +15775,7 @@
     </p:spTree>
     <p:extLst>
       <p:ext uri="{BB962C8B-B14F-4D97-AF65-F5344CB8AC3E}">
-        <p14:creationId xmlns:p14="http://schemas.microsoft.com/office/powerpoint/2010/main" val="919184816"/>
+        <p14:creationId xmlns:p14="http://schemas.microsoft.com/office/powerpoint/2010/main" xmlns="" val="919184816"/>
       </p:ext>
     </p:extLst>
   </p:cSld>
@@ -15980,7 +15980,7 @@
     </p:spTree>
     <p:extLst>
       <p:ext uri="{BB962C8B-B14F-4D97-AF65-F5344CB8AC3E}">
-        <p14:creationId xmlns:p14="http://schemas.microsoft.com/office/powerpoint/2010/main" val="3780490481"/>
+        <p14:creationId xmlns:p14="http://schemas.microsoft.com/office/powerpoint/2010/main" xmlns="" val="3780490481"/>
       </p:ext>
     </p:extLst>
   </p:cSld>
@@ -16019,7 +16019,7 @@
           <p:cNvPr id="14" name="Text Placeholder 12">
             <a:extLst>
               <a:ext uri="{FF2B5EF4-FFF2-40B4-BE49-F238E27FC236}">
-                <a16:creationId xmlns:a16="http://schemas.microsoft.com/office/drawing/2014/main" xmlns="" id="{276D560C-9AA8-4A22-A278-EE90E939A6AC}"/>
+                <a16:creationId xmlns="" xmlns:a16="http://schemas.microsoft.com/office/drawing/2014/main" id="{276D560C-9AA8-4A22-A278-EE90E939A6AC}"/>
               </a:ext>
             </a:extLst>
           </p:cNvPr>
@@ -16177,7 +16177,7 @@
     </p:spTree>
     <p:extLst>
       <p:ext uri="{BB962C8B-B14F-4D97-AF65-F5344CB8AC3E}">
-        <p14:creationId xmlns:p14="http://schemas.microsoft.com/office/powerpoint/2010/main" val="175485925"/>
+        <p14:creationId xmlns:p14="http://schemas.microsoft.com/office/powerpoint/2010/main" xmlns="" val="175485925"/>
       </p:ext>
     </p:extLst>
   </p:cSld>
@@ -16260,10 +16260,10 @@
           <p:nvPr/>
         </p:nvPicPr>
         <p:blipFill>
-          <a:blip r:embed="rId2">
+          <a:blip r:embed="rId2" cstate="print">
             <a:extLst>
               <a:ext uri="{28A0092B-C50C-407E-A947-70E740481C1C}">
-                <a14:useLocalDpi xmlns:a14="http://schemas.microsoft.com/office/drawing/2010/main" val="0"/>
+                <a14:useLocalDpi xmlns:a14="http://schemas.microsoft.com/office/drawing/2010/main" xmlns="" val="0"/>
               </a:ext>
             </a:extLst>
           </a:blip>
@@ -16290,10 +16290,10 @@
           <p:nvPr/>
         </p:nvPicPr>
         <p:blipFill>
-          <a:blip r:embed="rId3">
+          <a:blip r:embed="rId3" cstate="print">
             <a:extLst>
               <a:ext uri="{28A0092B-C50C-407E-A947-70E740481C1C}">
-                <a14:useLocalDpi xmlns:a14="http://schemas.microsoft.com/office/drawing/2010/main" val="0"/>
+                <a14:useLocalDpi xmlns:a14="http://schemas.microsoft.com/office/drawing/2010/main" xmlns="" val="0"/>
               </a:ext>
             </a:extLst>
           </a:blip>
@@ -16407,7 +16407,7 @@
     </p:spTree>
     <p:extLst>
       <p:ext uri="{BB962C8B-B14F-4D97-AF65-F5344CB8AC3E}">
-        <p14:creationId xmlns:p14="http://schemas.microsoft.com/office/powerpoint/2010/main" val="2914895542"/>
+        <p14:creationId xmlns:p14="http://schemas.microsoft.com/office/powerpoint/2010/main" xmlns="" val="2914895542"/>
       </p:ext>
     </p:extLst>
   </p:cSld>
@@ -16581,10 +16581,10 @@
           <p:nvPr/>
         </p:nvPicPr>
         <p:blipFill>
-          <a:blip r:embed="rId2">
+          <a:blip r:embed="rId2" cstate="print">
             <a:extLst>
               <a:ext uri="{28A0092B-C50C-407E-A947-70E740481C1C}">
-                <a14:useLocalDpi xmlns:a14="http://schemas.microsoft.com/office/drawing/2010/main" val="0"/>
+                <a14:useLocalDpi xmlns:a14="http://schemas.microsoft.com/office/drawing/2010/main" xmlns="" val="0"/>
               </a:ext>
             </a:extLst>
           </a:blip>
@@ -16605,7 +16605,7 @@
     </p:spTree>
     <p:extLst>
       <p:ext uri="{BB962C8B-B14F-4D97-AF65-F5344CB8AC3E}">
-        <p14:creationId xmlns:p14="http://schemas.microsoft.com/office/powerpoint/2010/main" val="3564036527"/>
+        <p14:creationId xmlns:p14="http://schemas.microsoft.com/office/powerpoint/2010/main" xmlns="" val="3564036527"/>
       </p:ext>
     </p:extLst>
   </p:cSld>
@@ -16779,10 +16779,10 @@
           <p:nvPr/>
         </p:nvPicPr>
         <p:blipFill>
-          <a:blip r:embed="rId2">
+          <a:blip r:embed="rId2" cstate="print">
             <a:extLst>
               <a:ext uri="{28A0092B-C50C-407E-A947-70E740481C1C}">
-                <a14:useLocalDpi xmlns:a14="http://schemas.microsoft.com/office/drawing/2010/main" val="0"/>
+                <a14:useLocalDpi xmlns:a14="http://schemas.microsoft.com/office/drawing/2010/main" xmlns="" val="0"/>
               </a:ext>
             </a:extLst>
           </a:blip>
@@ -16803,7 +16803,7 @@
     </p:spTree>
     <p:extLst>
       <p:ext uri="{BB962C8B-B14F-4D97-AF65-F5344CB8AC3E}">
-        <p14:creationId xmlns:p14="http://schemas.microsoft.com/office/powerpoint/2010/main" val="3897998553"/>
+        <p14:creationId xmlns:p14="http://schemas.microsoft.com/office/powerpoint/2010/main" xmlns="" val="3897998553"/>
       </p:ext>
     </p:extLst>
   </p:cSld>
@@ -16988,10 +16988,10 @@
           <p:nvPr/>
         </p:nvPicPr>
         <p:blipFill>
-          <a:blip r:embed="rId2">
+          <a:blip r:embed="rId2" cstate="print">
             <a:extLst>
               <a:ext uri="{28A0092B-C50C-407E-A947-70E740481C1C}">
-                <a14:useLocalDpi xmlns:a14="http://schemas.microsoft.com/office/drawing/2010/main" val="0"/>
+                <a14:useLocalDpi xmlns:a14="http://schemas.microsoft.com/office/drawing/2010/main" xmlns="" val="0"/>
               </a:ext>
             </a:extLst>
           </a:blip>
@@ -17012,7 +17012,7 @@
     </p:spTree>
     <p:extLst>
       <p:ext uri="{BB962C8B-B14F-4D97-AF65-F5344CB8AC3E}">
-        <p14:creationId xmlns:p14="http://schemas.microsoft.com/office/powerpoint/2010/main" val="4249111123"/>
+        <p14:creationId xmlns:p14="http://schemas.microsoft.com/office/powerpoint/2010/main" xmlns="" val="4249111123"/>
       </p:ext>
     </p:extLst>
   </p:cSld>
@@ -17206,10 +17206,10 @@
           <p:nvPr/>
         </p:nvPicPr>
         <p:blipFill>
-          <a:blip r:embed="rId2">
+          <a:blip r:embed="rId2" cstate="print">
             <a:extLst>
               <a:ext uri="{28A0092B-C50C-407E-A947-70E740481C1C}">
-                <a14:useLocalDpi xmlns:a14="http://schemas.microsoft.com/office/drawing/2010/main" val="0"/>
+                <a14:useLocalDpi xmlns:a14="http://schemas.microsoft.com/office/drawing/2010/main" xmlns="" val="0"/>
               </a:ext>
             </a:extLst>
           </a:blip>
@@ -17230,7 +17230,7 @@
     </p:spTree>
     <p:extLst>
       <p:ext uri="{BB962C8B-B14F-4D97-AF65-F5344CB8AC3E}">
-        <p14:creationId xmlns:p14="http://schemas.microsoft.com/office/powerpoint/2010/main" val="1064402005"/>
+        <p14:creationId xmlns:p14="http://schemas.microsoft.com/office/powerpoint/2010/main" xmlns="" val="1064402005"/>
       </p:ext>
     </p:extLst>
   </p:cSld>
@@ -17442,7 +17442,7 @@
   <a:extraClrSchemeLst/>
   <a:extLst>
     <a:ext uri="{05A4C25C-085E-4340-85A3-A5531E510DB2}">
-      <thm15:themeFamily xmlns:thm15="http://schemas.microsoft.com/office/thememl/2012/main" xmlns="" name="Presentation7" id="{EDBDD289-3946-6C44-95DC-76383EF7028A}" vid="{6D763B00-EF50-F542-BB8F-59F84E5659F4}"/>
+      <thm15:themeFamily xmlns="" xmlns:thm15="http://schemas.microsoft.com/office/thememl/2012/main" name="Presentation7" id="{EDBDD289-3946-6C44-95DC-76383EF7028A}" vid="{6D763B00-EF50-F542-BB8F-59F84E5659F4}"/>
     </a:ext>
   </a:extLst>
 </a:theme>
@@ -17643,7 +17643,7 @@
   <a:extraClrSchemeLst/>
   <a:extLst>
     <a:ext uri="{05A4C25C-085E-4340-85A3-A5531E510DB2}">
-      <thm15:themeFamily xmlns:thm15="http://schemas.microsoft.com/office/thememl/2012/main" xmlns="" name="Presentation7" id="{EDBDD289-3946-6C44-95DC-76383EF7028A}" vid="{6D763B00-EF50-F542-BB8F-59F84E5659F4}"/>
+      <thm15:themeFamily xmlns="" xmlns:thm15="http://schemas.microsoft.com/office/thememl/2012/main" name="Presentation7" id="{EDBDD289-3946-6C44-95DC-76383EF7028A}" vid="{6D763B00-EF50-F542-BB8F-59F84E5659F4}"/>
     </a:ext>
   </a:extLst>
 </a:theme>
@@ -17844,7 +17844,7 @@
   <a:extraClrSchemeLst/>
   <a:extLst>
     <a:ext uri="{05A4C25C-085E-4340-85A3-A5531E510DB2}">
-      <thm15:themeFamily xmlns:thm15="http://schemas.microsoft.com/office/thememl/2012/main" xmlns="" name="Presentation7" id="{EDBDD289-3946-6C44-95DC-76383EF7028A}" vid="{6D763B00-EF50-F542-BB8F-59F84E5659F4}"/>
+      <thm15:themeFamily xmlns="" xmlns:thm15="http://schemas.microsoft.com/office/thememl/2012/main" name="Presentation7" id="{EDBDD289-3946-6C44-95DC-76383EF7028A}" vid="{6D763B00-EF50-F542-BB8F-59F84E5659F4}"/>
     </a:ext>
   </a:extLst>
 </a:theme>
@@ -17893,7 +17893,7 @@
     </a:clrScheme>
     <a:fontScheme name="Office">
       <a:majorFont>
-        <a:latin typeface="Calibri Light" panose="020F0302020204030204"/>
+        <a:latin typeface="Calibri Light"/>
         <a:ea typeface=""/>
         <a:cs typeface=""/>
         <a:font script="Jpan" typeface="游ゴシック Light"/>
@@ -17928,7 +17928,7 @@
         <a:font script="Geor" typeface="Sylfaen"/>
       </a:majorFont>
       <a:minorFont>
-        <a:latin typeface="Calibri" panose="020F0502020204030204"/>
+        <a:latin typeface="Calibri"/>
         <a:ea typeface=""/>
         <a:cs typeface=""/>
         <a:font script="Jpan" typeface="游ゴシック"/>
@@ -18105,13 +18105,30 @@
   <a:extraClrSchemeLst/>
   <a:extLst>
     <a:ext uri="{05A4C25C-085E-4340-85A3-A5531E510DB2}">
-      <thm15:themeFamily xmlns:thm15="http://schemas.microsoft.com/office/thememl/2012/main" xmlns="" name="Office Theme" id="{62F939B6-93AF-4DB8-9C6B-D6C7DFDC589F}" vid="{4A3C46E8-61CC-4603-A589-7422A47A8E4A}"/>
+      <thm15:themeFamily xmlns="" xmlns:thm15="http://schemas.microsoft.com/office/thememl/2012/main" name="Office Theme" id="{62F939B6-93AF-4DB8-9C6B-D6C7DFDC589F}" vid="{4A3C46E8-61CC-4603-A589-7422A47A8E4A}"/>
     </a:ext>
   </a:extLst>
 </a:theme>
 </file>
 
 <file path=customXml/item1.xml><?xml version="1.0" encoding="utf-8"?>
+<?mso-contentType ?>
+<FormTemplates xmlns="http://schemas.microsoft.com/sharepoint/v3/contenttype/forms">
+  <Display>DocumentLibraryForm</Display>
+  <Edit>DocumentLibraryForm</Edit>
+  <New>DocumentLibraryForm</New>
+</FormTemplates>
+</file>
+
+<file path=customXml/item2.xml><?xml version="1.0" encoding="utf-8"?>
+<p:properties xmlns:p="http://schemas.microsoft.com/office/2006/metadata/properties" xmlns:xsi="http://www.w3.org/2001/XMLSchema-instance" xmlns:pc="http://schemas.microsoft.com/office/infopath/2007/PartnerControls">
+  <documentManagement>
+    <_x041a__x043e__x043c__x0435__x0442__x0430__x0440_ xmlns="835f28f2-30f1-4728-84d2-86d96e143488" xsi:nil="true"/>
+  </documentManagement>
+</p:properties>
+</file>
+
+<file path=customXml/item3.xml><?xml version="1.0" encoding="utf-8"?>
 <ct:contentTypeSchema xmlns:ct="http://schemas.microsoft.com/office/2006/metadata/contentType" xmlns:ma="http://schemas.microsoft.com/office/2006/metadata/properties/metaAttributes" ct:_="" ma:_="" ma:contentTypeName="Document" ma:contentTypeID="0x0101004195FC54A15F344D83577B1CDDD67A5D" ma:contentTypeVersion="13" ma:contentTypeDescription="Create a new document." ma:contentTypeScope="" ma:versionID="30ded57c9b2156718eb8cc7b0e4246dc">
   <xsd:schema xmlns:xsd="http://www.w3.org/2001/XMLSchema" xmlns:xs="http://www.w3.org/2001/XMLSchema" xmlns:p="http://schemas.microsoft.com/office/2006/metadata/properties" xmlns:ns2="341e6018-ac0a-4dfb-8409-db9e0d25502e" xmlns:ns3="835f28f2-30f1-4728-84d2-86d96e143488" targetNamespace="http://schemas.microsoft.com/office/2006/metadata/properties" ma:root="true" ma:fieldsID="a0d1831635397921c92a19e568dfc949" ns2:_="" ns3:_="">
     <xsd:import namespace="341e6018-ac0a-4dfb-8409-db9e0d25502e"/>
@@ -18336,38 +18353,10 @@
 </ct:contentTypeSchema>
 </file>
 
-<file path=customXml/item2.xml><?xml version="1.0" encoding="utf-8"?>
-<p:properties xmlns:p="http://schemas.microsoft.com/office/2006/metadata/properties" xmlns:xsi="http://www.w3.org/2001/XMLSchema-instance" xmlns:pc="http://schemas.microsoft.com/office/infopath/2007/PartnerControls">
-  <documentManagement>
-    <_x041a__x043e__x043c__x0435__x0442__x0430__x0440_ xmlns="835f28f2-30f1-4728-84d2-86d96e143488" xsi:nil="true"/>
-  </documentManagement>
-</p:properties>
-</file>
-
-<file path=customXml/item3.xml><?xml version="1.0" encoding="utf-8"?>
-<?mso-contentType ?>
-<FormTemplates xmlns="http://schemas.microsoft.com/sharepoint/v3/contenttype/forms">
-  <Display>DocumentLibraryForm</Display>
-  <Edit>DocumentLibraryForm</Edit>
-  <New>DocumentLibraryForm</New>
-</FormTemplates>
-</file>
-
 <file path=customXml/itemProps1.xml><?xml version="1.0" encoding="utf-8"?>
-<ds:datastoreItem xmlns:ds="http://schemas.openxmlformats.org/officeDocument/2006/customXml" ds:itemID="{5BCFD5A9-9FF3-42E0-89D7-BF5BFC61DD60}">
+<ds:datastoreItem xmlns:ds="http://schemas.openxmlformats.org/officeDocument/2006/customXml" ds:itemID="{296B3B9E-03D8-4766-BF45-6129617CF026}">
   <ds:schemaRefs>
-    <ds:schemaRef ds:uri="341e6018-ac0a-4dfb-8409-db9e0d25502e"/>
-    <ds:schemaRef ds:uri="835f28f2-30f1-4728-84d2-86d96e143488"/>
-    <ds:schemaRef ds:uri="http://purl.org/dc/elements/1.1/"/>
-    <ds:schemaRef ds:uri="http://purl.org/dc/terms/"/>
-    <ds:schemaRef ds:uri="http://schemas.microsoft.com/internal/obd"/>
-    <ds:schemaRef ds:uri="http://schemas.microsoft.com/office/2006/documentManagement/types"/>
-    <ds:schemaRef ds:uri="http://schemas.microsoft.com/office/2006/metadata/contentType"/>
-    <ds:schemaRef ds:uri="http://schemas.microsoft.com/office/2006/metadata/properties"/>
-    <ds:schemaRef ds:uri="http://schemas.microsoft.com/office/2006/metadata/properties/metaAttributes"/>
-    <ds:schemaRef ds:uri="http://schemas.microsoft.com/office/infopath/2007/PartnerControls"/>
-    <ds:schemaRef ds:uri="http://schemas.openxmlformats.org/package/2006/metadata/core-properties"/>
-    <ds:schemaRef ds:uri="http://www.w3.org/2001/XMLSchema"/>
+    <ds:schemaRef ds:uri="http://schemas.microsoft.com/sharepoint/v3/contenttype/forms"/>
   </ds:schemaRefs>
 </ds:datastoreItem>
 </file>
@@ -18390,9 +18379,20 @@
 </file>
 
 <file path=customXml/itemProps3.xml><?xml version="1.0" encoding="utf-8"?>
-<ds:datastoreItem xmlns:ds="http://schemas.openxmlformats.org/officeDocument/2006/customXml" ds:itemID="{296B3B9E-03D8-4766-BF45-6129617CF026}">
+<ds:datastoreItem xmlns:ds="http://schemas.openxmlformats.org/officeDocument/2006/customXml" ds:itemID="{5BCFD5A9-9FF3-42E0-89D7-BF5BFC61DD60}">
   <ds:schemaRefs>
-    <ds:schemaRef ds:uri="http://schemas.microsoft.com/sharepoint/v3/contenttype/forms"/>
+    <ds:schemaRef ds:uri="341e6018-ac0a-4dfb-8409-db9e0d25502e"/>
+    <ds:schemaRef ds:uri="835f28f2-30f1-4728-84d2-86d96e143488"/>
+    <ds:schemaRef ds:uri="http://purl.org/dc/elements/1.1/"/>
+    <ds:schemaRef ds:uri="http://purl.org/dc/terms/"/>
+    <ds:schemaRef ds:uri="http://schemas.microsoft.com/internal/obd"/>
+    <ds:schemaRef ds:uri="http://schemas.microsoft.com/office/2006/documentManagement/types"/>
+    <ds:schemaRef ds:uri="http://schemas.microsoft.com/office/2006/metadata/contentType"/>
+    <ds:schemaRef ds:uri="http://schemas.microsoft.com/office/2006/metadata/properties"/>
+    <ds:schemaRef ds:uri="http://schemas.microsoft.com/office/2006/metadata/properties/metaAttributes"/>
+    <ds:schemaRef ds:uri="http://schemas.microsoft.com/office/infopath/2007/PartnerControls"/>
+    <ds:schemaRef ds:uri="http://schemas.openxmlformats.org/package/2006/metadata/core-properties"/>
+    <ds:schemaRef ds:uri="http://www.w3.org/2001/XMLSchema"/>
   </ds:schemaRefs>
 </ds:datastoreItem>
 </file>
</xml_diff>